<commit_message>
Mise à jour - Écran de statistiques
*Ajout de tous les champs dans l'écran de statistiques
*Ajout de toutes les propriétés propres à chaque champ (nom, margin,
etc.)
*Écran de statistiques terminée, mais non fonctionnelle.
</commit_message>
<xml_diff>
--- a/Écrans_Navigation_Combaxe.pptx
+++ b/Écrans_Navigation_Combaxe.pptx
@@ -232,7 +232,7 @@
           <a:p>
             <a:fld id="{F26B38FF-9030-4FED-9577-CB19130A0EB0}" type="datetimeFigureOut">
               <a:rPr lang="fr-CA" smtClean="0"/>
-              <a:t>2014-10-02</a:t>
+              <a:t>2014-10-28</a:t>
             </a:fld>
             <a:endParaRPr lang="fr-CA"/>
           </a:p>
@@ -1454,7 +1454,7 @@
           <a:p>
             <a:fld id="{DDA46014-27EF-4C52-946F-6C4AFDC5E7DC}" type="datetimeFigureOut">
               <a:rPr lang="fr-CA" smtClean="0"/>
-              <a:t>2014-10-02</a:t>
+              <a:t>2014-10-28</a:t>
             </a:fld>
             <a:endParaRPr lang="fr-CA"/>
           </a:p>
@@ -1624,7 +1624,7 @@
           <a:p>
             <a:fld id="{DDA46014-27EF-4C52-946F-6C4AFDC5E7DC}" type="datetimeFigureOut">
               <a:rPr lang="fr-CA" smtClean="0"/>
-              <a:t>2014-10-02</a:t>
+              <a:t>2014-10-28</a:t>
             </a:fld>
             <a:endParaRPr lang="fr-CA"/>
           </a:p>
@@ -1804,7 +1804,7 @@
           <a:p>
             <a:fld id="{DDA46014-27EF-4C52-946F-6C4AFDC5E7DC}" type="datetimeFigureOut">
               <a:rPr lang="fr-CA" smtClean="0"/>
-              <a:t>2014-10-02</a:t>
+              <a:t>2014-10-28</a:t>
             </a:fld>
             <a:endParaRPr lang="fr-CA"/>
           </a:p>
@@ -1974,7 +1974,7 @@
           <a:p>
             <a:fld id="{DDA46014-27EF-4C52-946F-6C4AFDC5E7DC}" type="datetimeFigureOut">
               <a:rPr lang="fr-CA" smtClean="0"/>
-              <a:t>2014-10-02</a:t>
+              <a:t>2014-10-28</a:t>
             </a:fld>
             <a:endParaRPr lang="fr-CA"/>
           </a:p>
@@ -2220,7 +2220,7 @@
           <a:p>
             <a:fld id="{DDA46014-27EF-4C52-946F-6C4AFDC5E7DC}" type="datetimeFigureOut">
               <a:rPr lang="fr-CA" smtClean="0"/>
-              <a:t>2014-10-02</a:t>
+              <a:t>2014-10-28</a:t>
             </a:fld>
             <a:endParaRPr lang="fr-CA"/>
           </a:p>
@@ -2452,7 +2452,7 @@
           <a:p>
             <a:fld id="{DDA46014-27EF-4C52-946F-6C4AFDC5E7DC}" type="datetimeFigureOut">
               <a:rPr lang="fr-CA" smtClean="0"/>
-              <a:t>2014-10-02</a:t>
+              <a:t>2014-10-28</a:t>
             </a:fld>
             <a:endParaRPr lang="fr-CA"/>
           </a:p>
@@ -2819,7 +2819,7 @@
           <a:p>
             <a:fld id="{DDA46014-27EF-4C52-946F-6C4AFDC5E7DC}" type="datetimeFigureOut">
               <a:rPr lang="fr-CA" smtClean="0"/>
-              <a:t>2014-10-02</a:t>
+              <a:t>2014-10-28</a:t>
             </a:fld>
             <a:endParaRPr lang="fr-CA"/>
           </a:p>
@@ -2937,7 +2937,7 @@
           <a:p>
             <a:fld id="{DDA46014-27EF-4C52-946F-6C4AFDC5E7DC}" type="datetimeFigureOut">
               <a:rPr lang="fr-CA" smtClean="0"/>
-              <a:t>2014-10-02</a:t>
+              <a:t>2014-10-28</a:t>
             </a:fld>
             <a:endParaRPr lang="fr-CA"/>
           </a:p>
@@ -3032,7 +3032,7 @@
           <a:p>
             <a:fld id="{DDA46014-27EF-4C52-946F-6C4AFDC5E7DC}" type="datetimeFigureOut">
               <a:rPr lang="fr-CA" smtClean="0"/>
-              <a:t>2014-10-02</a:t>
+              <a:t>2014-10-28</a:t>
             </a:fld>
             <a:endParaRPr lang="fr-CA"/>
           </a:p>
@@ -3309,7 +3309,7 @@
           <a:p>
             <a:fld id="{DDA46014-27EF-4C52-946F-6C4AFDC5E7DC}" type="datetimeFigureOut">
               <a:rPr lang="fr-CA" smtClean="0"/>
-              <a:t>2014-10-02</a:t>
+              <a:t>2014-10-28</a:t>
             </a:fld>
             <a:endParaRPr lang="fr-CA"/>
           </a:p>
@@ -3562,7 +3562,7 @@
           <a:p>
             <a:fld id="{DDA46014-27EF-4C52-946F-6C4AFDC5E7DC}" type="datetimeFigureOut">
               <a:rPr lang="fr-CA" smtClean="0"/>
-              <a:t>2014-10-02</a:t>
+              <a:t>2014-10-28</a:t>
             </a:fld>
             <a:endParaRPr lang="fr-CA"/>
           </a:p>
@@ -3784,7 +3784,7 @@
           <a:p>
             <a:fld id="{DDA46014-27EF-4C52-946F-6C4AFDC5E7DC}" type="datetimeFigureOut">
               <a:rPr lang="fr-CA" smtClean="0"/>
-              <a:t>2014-10-02</a:t>
+              <a:t>2014-10-28</a:t>
             </a:fld>
             <a:endParaRPr lang="fr-CA"/>
           </a:p>

</xml_diff>